<commit_message>
Updated Project Definition, initial bootstrapTemplate from http://startbootstrap.com
</commit_message>
<xml_diff>
--- a/Class-Chuah/Project Definition_Barry_Weiner.pptx
+++ b/Class-Chuah/Project Definition_Barry_Weiner.pptx
@@ -4,14 +4,16 @@
   <p:sldMasterIdLst>
     <p:sldMasterId id="2147483841" r:id="rId1"/>
   </p:sldMasterIdLst>
+  <p:notesMasterIdLst>
+    <p:notesMasterId r:id="rId8"/>
+  </p:notesMasterIdLst>
   <p:sldIdLst>
     <p:sldId id="256" r:id="rId2"/>
     <p:sldId id="257" r:id="rId3"/>
     <p:sldId id="258" r:id="rId4"/>
     <p:sldId id="259" r:id="rId5"/>
-    <p:sldId id="260" r:id="rId6"/>
-    <p:sldId id="261" r:id="rId7"/>
-    <p:sldId id="262" r:id="rId8"/>
+    <p:sldId id="261" r:id="rId6"/>
+    <p:sldId id="263" r:id="rId7"/>
   </p:sldIdLst>
   <p:sldSz cx="9144000" cy="6858000" type="screen4x3"/>
   <p:notesSz cx="6858000" cy="9144000"/>
@@ -111,6 +113,440 @@
     </a:lvl9pPr>
   </p:defaultTextStyle>
 </p:presentation>
+</file>
+
+<file path=ppt/notesMasters/notesMaster1.xml><?xml version="1.0" encoding="utf-8"?>
+<p:notesMaster xmlns:a="http://schemas.openxmlformats.org/drawingml/2006/main" xmlns:r="http://schemas.openxmlformats.org/officeDocument/2006/relationships" xmlns:p="http://schemas.openxmlformats.org/presentationml/2006/main">
+  <p:cSld>
+    <p:bg>
+      <p:bgRef idx="1001">
+        <a:schemeClr val="bg1"/>
+      </p:bgRef>
+    </p:bg>
+    <p:spTree>
+      <p:nvGrpSpPr>
+        <p:cNvPr id="1" name=""/>
+        <p:cNvGrpSpPr/>
+        <p:nvPr/>
+      </p:nvGrpSpPr>
+      <p:grpSpPr>
+        <a:xfrm>
+          <a:off x="0" y="0"/>
+          <a:ext cx="0" cy="0"/>
+          <a:chOff x="0" y="0"/>
+          <a:chExt cx="0" cy="0"/>
+        </a:xfrm>
+      </p:grpSpPr>
+      <p:sp>
+        <p:nvSpPr>
+          <p:cNvPr id="2" name="Header Placeholder 1"/>
+          <p:cNvSpPr>
+            <a:spLocks noGrp="1"/>
+          </p:cNvSpPr>
+          <p:nvPr>
+            <p:ph type="hdr" sz="quarter"/>
+          </p:nvPr>
+        </p:nvSpPr>
+        <p:spPr>
+          <a:xfrm>
+            <a:off x="0" y="0"/>
+            <a:ext cx="2971800" cy="457200"/>
+          </a:xfrm>
+          <a:prstGeom prst="rect">
+            <a:avLst/>
+          </a:prstGeom>
+        </p:spPr>
+        <p:txBody>
+          <a:bodyPr vert="horz" lIns="91440" tIns="45720" rIns="91440" bIns="45720" rtlCol="0"/>
+          <a:lstStyle>
+            <a:lvl1pPr algn="l">
+              <a:defRPr sz="1200"/>
+            </a:lvl1pPr>
+          </a:lstStyle>
+          <a:p>
+            <a:endParaRPr lang="en-US"/>
+          </a:p>
+        </p:txBody>
+      </p:sp>
+      <p:sp>
+        <p:nvSpPr>
+          <p:cNvPr id="3" name="Date Placeholder 2"/>
+          <p:cNvSpPr>
+            <a:spLocks noGrp="1"/>
+          </p:cNvSpPr>
+          <p:nvPr>
+            <p:ph type="dt" idx="1"/>
+          </p:nvPr>
+        </p:nvSpPr>
+        <p:spPr>
+          <a:xfrm>
+            <a:off x="3884613" y="0"/>
+            <a:ext cx="2971800" cy="457200"/>
+          </a:xfrm>
+          <a:prstGeom prst="rect">
+            <a:avLst/>
+          </a:prstGeom>
+        </p:spPr>
+        <p:txBody>
+          <a:bodyPr vert="horz" lIns="91440" tIns="45720" rIns="91440" bIns="45720" rtlCol="0"/>
+          <a:lstStyle>
+            <a:lvl1pPr algn="r">
+              <a:defRPr sz="1200"/>
+            </a:lvl1pPr>
+          </a:lstStyle>
+          <a:p>
+            <a:fld id="{9C0823FA-A908-D14A-9694-26B0F2713369}" type="datetimeFigureOut">
+              <a:rPr lang="en-US" smtClean="0"/>
+              <a:t>9/9/15</a:t>
+            </a:fld>
+            <a:endParaRPr lang="en-US"/>
+          </a:p>
+        </p:txBody>
+      </p:sp>
+      <p:sp>
+        <p:nvSpPr>
+          <p:cNvPr id="4" name="Slide Image Placeholder 3"/>
+          <p:cNvSpPr>
+            <a:spLocks noGrp="1" noRot="1" noChangeAspect="1"/>
+          </p:cNvSpPr>
+          <p:nvPr>
+            <p:ph type="sldImg" idx="2"/>
+          </p:nvPr>
+        </p:nvSpPr>
+        <p:spPr>
+          <a:xfrm>
+            <a:off x="1143000" y="685800"/>
+            <a:ext cx="4572000" cy="3429000"/>
+          </a:xfrm>
+          <a:prstGeom prst="rect">
+            <a:avLst/>
+          </a:prstGeom>
+          <a:noFill/>
+          <a:ln w="12700">
+            <a:solidFill>
+              <a:prstClr val="black"/>
+            </a:solidFill>
+          </a:ln>
+        </p:spPr>
+        <p:txBody>
+          <a:bodyPr vert="horz" lIns="91440" tIns="45720" rIns="91440" bIns="45720" rtlCol="0" anchor="ctr"/>
+          <a:lstStyle/>
+          <a:p>
+            <a:endParaRPr lang="en-US"/>
+          </a:p>
+        </p:txBody>
+      </p:sp>
+      <p:sp>
+        <p:nvSpPr>
+          <p:cNvPr id="5" name="Notes Placeholder 4"/>
+          <p:cNvSpPr>
+            <a:spLocks noGrp="1"/>
+          </p:cNvSpPr>
+          <p:nvPr>
+            <p:ph type="body" sz="quarter" idx="3"/>
+          </p:nvPr>
+        </p:nvSpPr>
+        <p:spPr>
+          <a:xfrm>
+            <a:off x="685800" y="4343400"/>
+            <a:ext cx="5486400" cy="4114800"/>
+          </a:xfrm>
+          <a:prstGeom prst="rect">
+            <a:avLst/>
+          </a:prstGeom>
+        </p:spPr>
+        <p:txBody>
+          <a:bodyPr vert="horz" lIns="91440" tIns="45720" rIns="91440" bIns="45720" rtlCol="0"/>
+          <a:lstStyle/>
+          <a:p>
+            <a:pPr lvl="0"/>
+            <a:r>
+              <a:rPr lang="en-US" smtClean="0"/>
+              <a:t>Click to edit Master text styles</a:t>
+            </a:r>
+          </a:p>
+          <a:p>
+            <a:pPr lvl="1"/>
+            <a:r>
+              <a:rPr lang="en-US" smtClean="0"/>
+              <a:t>Second level</a:t>
+            </a:r>
+          </a:p>
+          <a:p>
+            <a:pPr lvl="2"/>
+            <a:r>
+              <a:rPr lang="en-US" smtClean="0"/>
+              <a:t>Third level</a:t>
+            </a:r>
+          </a:p>
+          <a:p>
+            <a:pPr lvl="3"/>
+            <a:r>
+              <a:rPr lang="en-US" smtClean="0"/>
+              <a:t>Fourth level</a:t>
+            </a:r>
+          </a:p>
+          <a:p>
+            <a:pPr lvl="4"/>
+            <a:r>
+              <a:rPr lang="en-US" smtClean="0"/>
+              <a:t>Fifth level</a:t>
+            </a:r>
+            <a:endParaRPr lang="en-US"/>
+          </a:p>
+        </p:txBody>
+      </p:sp>
+      <p:sp>
+        <p:nvSpPr>
+          <p:cNvPr id="6" name="Footer Placeholder 5"/>
+          <p:cNvSpPr>
+            <a:spLocks noGrp="1"/>
+          </p:cNvSpPr>
+          <p:nvPr>
+            <p:ph type="ftr" sz="quarter" idx="4"/>
+          </p:nvPr>
+        </p:nvSpPr>
+        <p:spPr>
+          <a:xfrm>
+            <a:off x="0" y="8685213"/>
+            <a:ext cx="2971800" cy="457200"/>
+          </a:xfrm>
+          <a:prstGeom prst="rect">
+            <a:avLst/>
+          </a:prstGeom>
+        </p:spPr>
+        <p:txBody>
+          <a:bodyPr vert="horz" lIns="91440" tIns="45720" rIns="91440" bIns="45720" rtlCol="0" anchor="b"/>
+          <a:lstStyle>
+            <a:lvl1pPr algn="l">
+              <a:defRPr sz="1200"/>
+            </a:lvl1pPr>
+          </a:lstStyle>
+          <a:p>
+            <a:endParaRPr lang="en-US"/>
+          </a:p>
+        </p:txBody>
+      </p:sp>
+      <p:sp>
+        <p:nvSpPr>
+          <p:cNvPr id="7" name="Slide Number Placeholder 6"/>
+          <p:cNvSpPr>
+            <a:spLocks noGrp="1"/>
+          </p:cNvSpPr>
+          <p:nvPr>
+            <p:ph type="sldNum" sz="quarter" idx="5"/>
+          </p:nvPr>
+        </p:nvSpPr>
+        <p:spPr>
+          <a:xfrm>
+            <a:off x="3884613" y="8685213"/>
+            <a:ext cx="2971800" cy="457200"/>
+          </a:xfrm>
+          <a:prstGeom prst="rect">
+            <a:avLst/>
+          </a:prstGeom>
+        </p:spPr>
+        <p:txBody>
+          <a:bodyPr vert="horz" lIns="91440" tIns="45720" rIns="91440" bIns="45720" rtlCol="0" anchor="b"/>
+          <a:lstStyle>
+            <a:lvl1pPr algn="r">
+              <a:defRPr sz="1200"/>
+            </a:lvl1pPr>
+          </a:lstStyle>
+          <a:p>
+            <a:fld id="{603A0716-987C-5141-A653-B8A3E424DE35}" type="slidenum">
+              <a:rPr lang="en-US" smtClean="0"/>
+              <a:t>‹#›</a:t>
+            </a:fld>
+            <a:endParaRPr lang="en-US"/>
+          </a:p>
+        </p:txBody>
+      </p:sp>
+    </p:spTree>
+    <p:extLst>
+      <p:ext uri="{BB962C8B-B14F-4D97-AF65-F5344CB8AC3E}">
+        <p14:creationId xmlns:p14="http://schemas.microsoft.com/office/powerpoint/2010/main" val="2192440608"/>
+      </p:ext>
+    </p:extLst>
+  </p:cSld>
+  <p:clrMap bg1="lt1" tx1="dk1" bg2="lt2" tx2="dk2" accent1="accent1" accent2="accent2" accent3="accent3" accent4="accent4" accent5="accent5" accent6="accent6" hlink="hlink" folHlink="folHlink"/>
+  <p:notesStyle>
+    <a:lvl1pPr marL="0" algn="l" defTabSz="457200" rtl="0" eaLnBrk="1" latinLnBrk="0" hangingPunct="1">
+      <a:defRPr sz="1200" kern="1200">
+        <a:solidFill>
+          <a:schemeClr val="tx1"/>
+        </a:solidFill>
+        <a:latin typeface="+mn-lt"/>
+        <a:ea typeface="+mn-ea"/>
+        <a:cs typeface="+mn-cs"/>
+      </a:defRPr>
+    </a:lvl1pPr>
+    <a:lvl2pPr marL="457200" algn="l" defTabSz="457200" rtl="0" eaLnBrk="1" latinLnBrk="0" hangingPunct="1">
+      <a:defRPr sz="1200" kern="1200">
+        <a:solidFill>
+          <a:schemeClr val="tx1"/>
+        </a:solidFill>
+        <a:latin typeface="+mn-lt"/>
+        <a:ea typeface="+mn-ea"/>
+        <a:cs typeface="+mn-cs"/>
+      </a:defRPr>
+    </a:lvl2pPr>
+    <a:lvl3pPr marL="914400" algn="l" defTabSz="457200" rtl="0" eaLnBrk="1" latinLnBrk="0" hangingPunct="1">
+      <a:defRPr sz="1200" kern="1200">
+        <a:solidFill>
+          <a:schemeClr val="tx1"/>
+        </a:solidFill>
+        <a:latin typeface="+mn-lt"/>
+        <a:ea typeface="+mn-ea"/>
+        <a:cs typeface="+mn-cs"/>
+      </a:defRPr>
+    </a:lvl3pPr>
+    <a:lvl4pPr marL="1371600" algn="l" defTabSz="457200" rtl="0" eaLnBrk="1" latinLnBrk="0" hangingPunct="1">
+      <a:defRPr sz="1200" kern="1200">
+        <a:solidFill>
+          <a:schemeClr val="tx1"/>
+        </a:solidFill>
+        <a:latin typeface="+mn-lt"/>
+        <a:ea typeface="+mn-ea"/>
+        <a:cs typeface="+mn-cs"/>
+      </a:defRPr>
+    </a:lvl4pPr>
+    <a:lvl5pPr marL="1828800" algn="l" defTabSz="457200" rtl="0" eaLnBrk="1" latinLnBrk="0" hangingPunct="1">
+      <a:defRPr sz="1200" kern="1200">
+        <a:solidFill>
+          <a:schemeClr val="tx1"/>
+        </a:solidFill>
+        <a:latin typeface="+mn-lt"/>
+        <a:ea typeface="+mn-ea"/>
+        <a:cs typeface="+mn-cs"/>
+      </a:defRPr>
+    </a:lvl5pPr>
+    <a:lvl6pPr marL="2286000" algn="l" defTabSz="457200" rtl="0" eaLnBrk="1" latinLnBrk="0" hangingPunct="1">
+      <a:defRPr sz="1200" kern="1200">
+        <a:solidFill>
+          <a:schemeClr val="tx1"/>
+        </a:solidFill>
+        <a:latin typeface="+mn-lt"/>
+        <a:ea typeface="+mn-ea"/>
+        <a:cs typeface="+mn-cs"/>
+      </a:defRPr>
+    </a:lvl6pPr>
+    <a:lvl7pPr marL="2743200" algn="l" defTabSz="457200" rtl="0" eaLnBrk="1" latinLnBrk="0" hangingPunct="1">
+      <a:defRPr sz="1200" kern="1200">
+        <a:solidFill>
+          <a:schemeClr val="tx1"/>
+        </a:solidFill>
+        <a:latin typeface="+mn-lt"/>
+        <a:ea typeface="+mn-ea"/>
+        <a:cs typeface="+mn-cs"/>
+      </a:defRPr>
+    </a:lvl7pPr>
+    <a:lvl8pPr marL="3200400" algn="l" defTabSz="457200" rtl="0" eaLnBrk="1" latinLnBrk="0" hangingPunct="1">
+      <a:defRPr sz="1200" kern="1200">
+        <a:solidFill>
+          <a:schemeClr val="tx1"/>
+        </a:solidFill>
+        <a:latin typeface="+mn-lt"/>
+        <a:ea typeface="+mn-ea"/>
+        <a:cs typeface="+mn-cs"/>
+      </a:defRPr>
+    </a:lvl8pPr>
+    <a:lvl9pPr marL="3657600" algn="l" defTabSz="457200" rtl="0" eaLnBrk="1" latinLnBrk="0" hangingPunct="1">
+      <a:defRPr sz="1200" kern="1200">
+        <a:solidFill>
+          <a:schemeClr val="tx1"/>
+        </a:solidFill>
+        <a:latin typeface="+mn-lt"/>
+        <a:ea typeface="+mn-ea"/>
+        <a:cs typeface="+mn-cs"/>
+      </a:defRPr>
+    </a:lvl9pPr>
+  </p:notesStyle>
+</p:notesMaster>
+</file>
+
+<file path=ppt/notesSlides/notesSlide1.xml><?xml version="1.0" encoding="utf-8"?>
+<p:notes xmlns:a="http://schemas.openxmlformats.org/drawingml/2006/main" xmlns:r="http://schemas.openxmlformats.org/officeDocument/2006/relationships" xmlns:p="http://schemas.openxmlformats.org/presentationml/2006/main">
+  <p:cSld>
+    <p:spTree>
+      <p:nvGrpSpPr>
+        <p:cNvPr id="1" name=""/>
+        <p:cNvGrpSpPr/>
+        <p:nvPr/>
+      </p:nvGrpSpPr>
+      <p:grpSpPr>
+        <a:xfrm>
+          <a:off x="0" y="0"/>
+          <a:ext cx="0" cy="0"/>
+          <a:chOff x="0" y="0"/>
+          <a:chExt cx="0" cy="0"/>
+        </a:xfrm>
+      </p:grpSpPr>
+      <p:sp>
+        <p:nvSpPr>
+          <p:cNvPr id="2" name="Slide Image Placeholder 1"/>
+          <p:cNvSpPr>
+            <a:spLocks noGrp="1" noRot="1" noChangeAspect="1"/>
+          </p:cNvSpPr>
+          <p:nvPr>
+            <p:ph type="sldImg"/>
+          </p:nvPr>
+        </p:nvSpPr>
+        <p:spPr/>
+      </p:sp>
+      <p:sp>
+        <p:nvSpPr>
+          <p:cNvPr id="3" name="Notes Placeholder 2"/>
+          <p:cNvSpPr>
+            <a:spLocks noGrp="1"/>
+          </p:cNvSpPr>
+          <p:nvPr>
+            <p:ph type="body" idx="1"/>
+          </p:nvPr>
+        </p:nvSpPr>
+        <p:spPr/>
+        <p:txBody>
+          <a:bodyPr/>
+          <a:lstStyle/>
+          <a:p>
+            <a:endParaRPr lang="en-US" dirty="0"/>
+          </a:p>
+        </p:txBody>
+      </p:sp>
+      <p:sp>
+        <p:nvSpPr>
+          <p:cNvPr id="4" name="Slide Number Placeholder 3"/>
+          <p:cNvSpPr>
+            <a:spLocks noGrp="1"/>
+          </p:cNvSpPr>
+          <p:nvPr>
+            <p:ph type="sldNum" sz="quarter" idx="10"/>
+          </p:nvPr>
+        </p:nvSpPr>
+        <p:spPr/>
+        <p:txBody>
+          <a:bodyPr/>
+          <a:lstStyle/>
+          <a:p>
+            <a:fld id="{603A0716-987C-5141-A653-B8A3E424DE35}" type="slidenum">
+              <a:rPr lang="en-US" smtClean="0"/>
+              <a:t>2</a:t>
+            </a:fld>
+            <a:endParaRPr lang="en-US"/>
+          </a:p>
+        </p:txBody>
+      </p:sp>
+    </p:spTree>
+    <p:extLst>
+      <p:ext uri="{BB962C8B-B14F-4D97-AF65-F5344CB8AC3E}">
+        <p14:creationId xmlns:p14="http://schemas.microsoft.com/office/powerpoint/2010/main" val="1137735964"/>
+      </p:ext>
+    </p:extLst>
+  </p:cSld>
+  <p:clrMapOvr>
+    <a:masterClrMapping/>
+  </p:clrMapOvr>
+</p:notes>
 </file>
 
 <file path=ppt/slideLayouts/slideLayout1.xml><?xml version="1.0" encoding="utf-8"?>
@@ -2871,7 +3307,7 @@
             <a:fld id="{E30E2307-1E40-4E12-8716-25BFDA8E7013}" type="datetime1">
               <a:rPr lang="en-US" smtClean="0"/>
               <a:pPr/>
-              <a:t>9/8/15</a:t>
+              <a:t>9/9/15</a:t>
             </a:fld>
             <a:endParaRPr lang="en-US"/>
           </a:p>
@@ -3157,7 +3593,7 @@
           <a:p>
             <a:fld id="{D5484AA4-B392-5A41-B7BD-EDB33922D430}" type="datetimeFigureOut">
               <a:rPr lang="en-US" smtClean="0"/>
-              <a:t>9/8/15</a:t>
+              <a:t>9/9/15</a:t>
             </a:fld>
             <a:endParaRPr lang="en-US"/>
           </a:p>
@@ -3332,7 +3768,7 @@
           <a:p>
             <a:fld id="{D5484AA4-B392-5A41-B7BD-EDB33922D430}" type="datetimeFigureOut">
               <a:rPr lang="en-US" smtClean="0"/>
-              <a:t>9/8/15</a:t>
+              <a:t>9/9/15</a:t>
             </a:fld>
             <a:endParaRPr lang="en-US"/>
           </a:p>
@@ -3497,7 +3933,7 @@
           <a:p>
             <a:fld id="{D5484AA4-B392-5A41-B7BD-EDB33922D430}" type="datetimeFigureOut">
               <a:rPr lang="en-US" smtClean="0"/>
-              <a:t>9/8/15</a:t>
+              <a:t>9/9/15</a:t>
             </a:fld>
             <a:endParaRPr lang="en-US"/>
           </a:p>
@@ -3739,7 +4175,7 @@
             <a:fld id="{7B8AEBBE-F8B2-42CF-9895-E86A608384EB}" type="datetime1">
               <a:rPr lang="en-US" smtClean="0"/>
               <a:pPr/>
-              <a:t>9/8/15</a:t>
+              <a:t>9/9/15</a:t>
             </a:fld>
             <a:endParaRPr lang="en-US"/>
           </a:p>
@@ -3853,7 +4289,7 @@
           <a:p>
             <a:fld id="{D5484AA4-B392-5A41-B7BD-EDB33922D430}" type="datetimeFigureOut">
               <a:rPr lang="en-US" smtClean="0"/>
-              <a:t>9/8/15</a:t>
+              <a:t>9/9/15</a:t>
             </a:fld>
             <a:endParaRPr lang="en-US"/>
           </a:p>
@@ -4392,7 +4828,7 @@
           <a:p>
             <a:fld id="{D5484AA4-B392-5A41-B7BD-EDB33922D430}" type="datetimeFigureOut">
               <a:rPr lang="en-US" smtClean="0"/>
-              <a:t>9/8/15</a:t>
+              <a:t>9/9/15</a:t>
             </a:fld>
             <a:endParaRPr lang="en-US"/>
           </a:p>
@@ -4505,7 +4941,7 @@
           <a:p>
             <a:fld id="{D5484AA4-B392-5A41-B7BD-EDB33922D430}" type="datetimeFigureOut">
               <a:rPr lang="en-US" smtClean="0"/>
-              <a:t>9/8/15</a:t>
+              <a:t>9/9/15</a:t>
             </a:fld>
             <a:endParaRPr lang="en-US"/>
           </a:p>
@@ -4595,7 +5031,7 @@
           <a:p>
             <a:fld id="{D5484AA4-B392-5A41-B7BD-EDB33922D430}" type="datetimeFigureOut">
               <a:rPr lang="en-US" smtClean="0"/>
-              <a:t>9/8/15</a:t>
+              <a:t>9/9/15</a:t>
             </a:fld>
             <a:endParaRPr lang="en-US"/>
           </a:p>
@@ -7246,7 +7682,7 @@
           <a:p>
             <a:fld id="{D5484AA4-B392-5A41-B7BD-EDB33922D430}" type="datetimeFigureOut">
               <a:rPr lang="en-US" smtClean="0"/>
-              <a:t>9/8/15</a:t>
+              <a:t>9/9/15</a:t>
             </a:fld>
             <a:endParaRPr lang="en-US"/>
           </a:p>
@@ -10458,7 +10894,7 @@
           <a:p>
             <a:fld id="{D5484AA4-B392-5A41-B7BD-EDB33922D430}" type="datetimeFigureOut">
               <a:rPr lang="en-US" smtClean="0"/>
-              <a:t>9/8/15</a:t>
+              <a:t>9/9/15</a:t>
             </a:fld>
             <a:endParaRPr lang="en-US"/>
           </a:p>
@@ -13280,7 +13716,7 @@
           <a:p>
             <a:fld id="{D5484AA4-B392-5A41-B7BD-EDB33922D430}" type="datetimeFigureOut">
               <a:rPr lang="en-US" smtClean="0"/>
-              <a:t>9/8/15</a:t>
+              <a:t>9/9/15</a:t>
             </a:fld>
             <a:endParaRPr lang="en-US"/>
           </a:p>
@@ -13843,7 +14279,7 @@
           <p:nvPr/>
         </p:nvPicPr>
         <p:blipFill>
-          <a:blip r:embed="rId2"/>
+          <a:blip r:embed="rId3"/>
           <a:stretch>
             <a:fillRect/>
           </a:stretch>
@@ -13881,10 +14317,18 @@
           <a:lstStyle/>
           <a:p>
             <a:r>
-              <a:rPr lang="en-US" sz="4400" dirty="0" smtClean="0"/>
+              <a:rPr lang="en-US" sz="4400" dirty="0" smtClean="0">
+                <a:solidFill>
+                  <a:srgbClr val="94C600"/>
+                </a:solidFill>
+              </a:rPr>
               <a:t>Client </a:t>
             </a:r>
-            <a:endParaRPr lang="en-US" sz="4400" dirty="0"/>
+            <a:endParaRPr lang="en-US" sz="4400" dirty="0">
+              <a:solidFill>
+                <a:srgbClr val="94C600"/>
+              </a:solidFill>
+            </a:endParaRPr>
           </a:p>
         </p:txBody>
       </p:sp>
@@ -14037,10 +14481,18 @@
           <a:lstStyle/>
           <a:p>
             <a:r>
-              <a:rPr lang="en-US" sz="4000" dirty="0" smtClean="0"/>
+              <a:rPr lang="en-US" sz="4000" dirty="0" smtClean="0">
+                <a:solidFill>
+                  <a:schemeClr val="accent1"/>
+                </a:solidFill>
+              </a:rPr>
               <a:t>Problem</a:t>
             </a:r>
-            <a:endParaRPr lang="en-US" sz="4000" dirty="0"/>
+            <a:endParaRPr lang="en-US" sz="4000" dirty="0">
+              <a:solidFill>
+                <a:schemeClr val="accent1"/>
+              </a:solidFill>
+            </a:endParaRPr>
           </a:p>
         </p:txBody>
       </p:sp>
@@ -14119,10 +14571,18 @@
           <a:lstStyle/>
           <a:p>
             <a:r>
-              <a:rPr lang="en-US" dirty="0" smtClean="0"/>
+              <a:rPr lang="en-US" dirty="0" smtClean="0">
+                <a:solidFill>
+                  <a:srgbClr val="94C600"/>
+                </a:solidFill>
+              </a:rPr>
               <a:t>Our solution</a:t>
             </a:r>
-            <a:endParaRPr lang="en-US" dirty="0"/>
+            <a:endParaRPr lang="en-US" dirty="0">
+              <a:solidFill>
+                <a:srgbClr val="94C600"/>
+              </a:solidFill>
+            </a:endParaRPr>
           </a:p>
         </p:txBody>
       </p:sp>
@@ -14264,86 +14724,6 @@
         </p:nvSpPr>
         <p:spPr/>
         <p:txBody>
-          <a:bodyPr>
-            <a:normAutofit fontScale="90000"/>
-          </a:bodyPr>
-          <a:lstStyle/>
-          <a:p>
-            <a:r>
-              <a:rPr lang="en-US" dirty="0" smtClean="0"/>
-              <a:t>Why is this important?</a:t>
-            </a:r>
-            <a:br>
-              <a:rPr lang="en-US" dirty="0" smtClean="0"/>
-            </a:br>
-            <a:endParaRPr lang="en-US" dirty="0"/>
-          </a:p>
-        </p:txBody>
-      </p:sp>
-      <p:sp>
-        <p:nvSpPr>
-          <p:cNvPr id="3" name="Content Placeholder 2"/>
-          <p:cNvSpPr>
-            <a:spLocks noGrp="1"/>
-          </p:cNvSpPr>
-          <p:nvPr>
-            <p:ph idx="1"/>
-          </p:nvPr>
-        </p:nvSpPr>
-        <p:spPr/>
-        <p:txBody>
-          <a:bodyPr/>
-          <a:lstStyle/>
-          <a:p>
-            <a:endParaRPr lang="en-US" dirty="0" smtClean="0"/>
-          </a:p>
-          <a:p>
-            <a:endParaRPr lang="en-US" dirty="0"/>
-          </a:p>
-        </p:txBody>
-      </p:sp>
-    </p:spTree>
-    <p:extLst>
-      <p:ext uri="{BB962C8B-B14F-4D97-AF65-F5344CB8AC3E}">
-        <p14:creationId xmlns:p14="http://schemas.microsoft.com/office/powerpoint/2010/main" val="708702444"/>
-      </p:ext>
-    </p:extLst>
-  </p:cSld>
-  <p:clrMapOvr>
-    <a:masterClrMapping/>
-  </p:clrMapOvr>
-</p:sld>
-</file>
-
-<file path=ppt/slides/slide6.xml><?xml version="1.0" encoding="utf-8"?>
-<p:sld xmlns:a="http://schemas.openxmlformats.org/drawingml/2006/main" xmlns:r="http://schemas.openxmlformats.org/officeDocument/2006/relationships" xmlns:p="http://schemas.openxmlformats.org/presentationml/2006/main">
-  <p:cSld>
-    <p:spTree>
-      <p:nvGrpSpPr>
-        <p:cNvPr id="1" name=""/>
-        <p:cNvGrpSpPr/>
-        <p:nvPr/>
-      </p:nvGrpSpPr>
-      <p:grpSpPr>
-        <a:xfrm>
-          <a:off x="0" y="0"/>
-          <a:ext cx="0" cy="0"/>
-          <a:chOff x="0" y="0"/>
-          <a:chExt cx="0" cy="0"/>
-        </a:xfrm>
-      </p:grpSpPr>
-      <p:sp>
-        <p:nvSpPr>
-          <p:cNvPr id="2" name="Title 1"/>
-          <p:cNvSpPr>
-            <a:spLocks noGrp="1"/>
-          </p:cNvSpPr>
-          <p:nvPr>
-            <p:ph type="title"/>
-          </p:nvPr>
-        </p:nvSpPr>
-        <p:spPr/>
-        <p:txBody>
           <a:bodyPr/>
           <a:lstStyle/>
           <a:p>
@@ -14367,7 +14747,9 @@
         </p:nvSpPr>
         <p:spPr/>
         <p:txBody>
-          <a:bodyPr/>
+          <a:bodyPr>
+            <a:normAutofit/>
+          </a:bodyPr>
           <a:lstStyle/>
           <a:p>
             <a:pPr marL="457200" lvl="0" indent="-228600">
@@ -14402,19 +14784,7 @@
             </a:pPr>
             <a:r>
               <a:rPr lang="en" sz="1800" dirty="0"/>
-              <a:t>Profile page for each member</a:t>
-            </a:r>
-          </a:p>
-          <a:p>
-            <a:pPr marL="914400" lvl="1" indent="-228600">
-              <a:spcBef>
-                <a:spcPts val="0"/>
-              </a:spcBef>
-              <a:buSzPct val="100000"/>
-            </a:pPr>
-            <a:r>
-              <a:rPr lang="en" sz="1800" dirty="0"/>
-              <a:t>Role based access rights</a:t>
+              <a:t>Roster with contact information and positions</a:t>
             </a:r>
           </a:p>
           <a:p>
@@ -14426,20 +14796,11 @@
             </a:pPr>
             <a:r>
               <a:rPr lang="en" sz="1800" dirty="0" smtClean="0"/>
-              <a:t>Event information and signup system</a:t>
+              <a:t>Profile </a:t>
             </a:r>
-            <a:endParaRPr lang="en-US" sz="1800" dirty="0" smtClean="0"/>
-          </a:p>
-          <a:p>
-            <a:pPr marL="457200" lvl="0" indent="-228600">
-              <a:spcBef>
-                <a:spcPts val="0"/>
-              </a:spcBef>
-              <a:buSzPct val="100000"/>
-            </a:pPr>
             <a:r>
               <a:rPr lang="en" sz="1800" dirty="0"/>
-              <a:t>Phase 2</a:t>
+              <a:t>page for each member</a:t>
             </a:r>
           </a:p>
           <a:p>
@@ -14450,8 +14811,12 @@
               <a:buSzPct val="100000"/>
             </a:pPr>
             <a:r>
+              <a:rPr lang="en" sz="1800" dirty="0" smtClean="0"/>
+              <a:t>Role </a:t>
+            </a:r>
+            <a:r>
               <a:rPr lang="en" sz="1800" dirty="0"/>
-              <a:t>Links to each social media site</a:t>
+              <a:t>based access rights</a:t>
             </a:r>
           </a:p>
           <a:p>
@@ -14462,8 +14827,41 @@
               <a:buSzPct val="100000"/>
             </a:pPr>
             <a:r>
+              <a:rPr lang="en" sz="1800" dirty="0" smtClean="0"/>
+              <a:t>Event </a:t>
+            </a:r>
+            <a:r>
               <a:rPr lang="en" sz="1800" dirty="0"/>
-              <a:t>Roster with contact information and positions</a:t>
+              <a:t>information and sign up </a:t>
+            </a:r>
+            <a:r>
+              <a:rPr lang="en" sz="1800" dirty="0" smtClean="0"/>
+              <a:t>system</a:t>
+            </a:r>
+          </a:p>
+          <a:p>
+            <a:pPr marL="914400" lvl="1" indent="-228600">
+              <a:spcBef>
+                <a:spcPts val="0"/>
+              </a:spcBef>
+              <a:buSzPct val="100000"/>
+            </a:pPr>
+            <a:endParaRPr lang="en" sz="1800" dirty="0"/>
+          </a:p>
+          <a:p>
+            <a:pPr marL="457200" lvl="0" indent="-228600">
+              <a:spcBef>
+                <a:spcPts val="0"/>
+              </a:spcBef>
+              <a:buSzPct val="100000"/>
+            </a:pPr>
+            <a:r>
+              <a:rPr lang="en" sz="1800" dirty="0" smtClean="0"/>
+              <a:t>Phase </a:t>
+            </a:r>
+            <a:r>
+              <a:rPr lang="en" sz="1800" dirty="0"/>
+              <a:t>2</a:t>
             </a:r>
           </a:p>
           <a:p>
@@ -14474,8 +14872,12 @@
               <a:buSzPct val="100000"/>
             </a:pPr>
             <a:r>
+              <a:rPr lang="en" sz="1800" dirty="0" smtClean="0"/>
+              <a:t>Links </a:t>
+            </a:r>
+            <a:r>
               <a:rPr lang="en" sz="1800" dirty="0"/>
-              <a:t>Menu for the week, as per the chef</a:t>
+              <a:t>to each social media site</a:t>
             </a:r>
           </a:p>
           <a:p>
@@ -14486,8 +14888,28 @@
               <a:buSzPct val="100000"/>
             </a:pPr>
             <a:r>
+              <a:rPr lang="en" sz="1800" dirty="0" smtClean="0"/>
+              <a:t>Menu </a:t>
+            </a:r>
+            <a:r>
               <a:rPr lang="en" sz="1800" dirty="0"/>
-              <a:t>Keeping track of event attendance based on signups </a:t>
+              <a:t>for the week, as per the chef</a:t>
+            </a:r>
+          </a:p>
+          <a:p>
+            <a:pPr marL="914400" lvl="1" indent="-228600">
+              <a:spcBef>
+                <a:spcPts val="0"/>
+              </a:spcBef>
+              <a:buSzPct val="100000"/>
+            </a:pPr>
+            <a:r>
+              <a:rPr lang="en" sz="1800" dirty="0" smtClean="0"/>
+              <a:t>Keeping </a:t>
+            </a:r>
+            <a:r>
+              <a:rPr lang="en" sz="1800" dirty="0"/>
+              <a:t>track of event attendance based on sign-ups</a:t>
             </a:r>
           </a:p>
           <a:p>
@@ -14515,7 +14937,7 @@
 </p:sld>
 </file>
 
-<file path=ppt/slides/slide7.xml><?xml version="1.0" encoding="utf-8"?>
+<file path=ppt/slides/slide6.xml><?xml version="1.0" encoding="utf-8"?>
 <p:sld xmlns:a="http://schemas.openxmlformats.org/drawingml/2006/main" xmlns:r="http://schemas.openxmlformats.org/officeDocument/2006/relationships" xmlns:p="http://schemas.openxmlformats.org/presentationml/2006/main">
   <p:cSld>
     <p:spTree>
@@ -14565,9 +14987,16 @@
             <p:ph idx="1"/>
           </p:nvPr>
         </p:nvSpPr>
-        <p:spPr/>
+        <p:spPr>
+          <a:xfrm>
+            <a:off x="1043492" y="2323652"/>
+            <a:ext cx="7024742" cy="3508977"/>
+          </a:xfrm>
+        </p:spPr>
         <p:txBody>
-          <a:bodyPr/>
+          <a:bodyPr>
+            <a:normAutofit/>
+          </a:bodyPr>
           <a:lstStyle/>
           <a:p>
             <a:pPr marL="457200" lvl="0" indent="-228600">
@@ -14577,8 +15006,8 @@
               <a:buSzPct val="100000"/>
             </a:pPr>
             <a:r>
-              <a:rPr lang="en" sz="1800" dirty="0"/>
-              <a:t>Phase 1</a:t>
+              <a:rPr lang="en-US" sz="1800" dirty="0" smtClean="0"/>
+              <a:t>Platform Phases</a:t>
             </a:r>
           </a:p>
           <a:p>
@@ -14589,8 +15018,12 @@
               <a:buSzPct val="100000"/>
             </a:pPr>
             <a:r>
+              <a:rPr lang="en" sz="1800" dirty="0" smtClean="0"/>
+              <a:t>Phase 1: run </a:t>
+            </a:r>
+            <a:r>
               <a:rPr lang="en" sz="1800" dirty="0"/>
-              <a:t>Each chapter can subscribe to this service</a:t>
+              <a:t>application on a desktop web browser</a:t>
             </a:r>
           </a:p>
           <a:p>
@@ -14601,8 +15034,16 @@
               <a:buSzPct val="100000"/>
             </a:pPr>
             <a:r>
+              <a:rPr lang="en" sz="1800" dirty="0" smtClean="0"/>
+              <a:t>Phase 2: run </a:t>
+            </a:r>
+            <a:r>
               <a:rPr lang="en" sz="1800" dirty="0"/>
-              <a:t>Profile page for each member</a:t>
+              <a:t>application on a  mobile web </a:t>
+            </a:r>
+            <a:r>
+              <a:rPr lang="en" sz="1800" dirty="0" smtClean="0"/>
+              <a:t>browser</a:t>
             </a:r>
           </a:p>
           <a:p>
@@ -14613,8 +15054,16 @@
               <a:buSzPct val="100000"/>
             </a:pPr>
             <a:r>
+              <a:rPr lang="en" sz="1800" dirty="0" smtClean="0"/>
+              <a:t>Phase 3: run </a:t>
+            </a:r>
+            <a:r>
               <a:rPr lang="en" sz="1800" dirty="0"/>
-              <a:t>Role based access rights</a:t>
+              <a:t>application as a native app using Phonegap (using data</a:t>
+            </a:r>
+            <a:r>
+              <a:rPr lang="en" sz="1800" dirty="0" smtClean="0"/>
+              <a:t>)</a:t>
             </a:r>
           </a:p>
           <a:p>
@@ -14624,22 +15073,68 @@
               </a:spcBef>
               <a:buSzPct val="100000"/>
             </a:pPr>
+            <a:endParaRPr lang="en" sz="1800" dirty="0"/>
+          </a:p>
+          <a:p>
+            <a:pPr marL="457200" lvl="0" indent="-228600">
+              <a:spcBef>
+                <a:spcPts val="0"/>
+              </a:spcBef>
+              <a:buSzPct val="100000"/>
+            </a:pPr>
             <a:r>
               <a:rPr lang="en" sz="1800" dirty="0"/>
-              <a:t>Event information and signup </a:t>
+              <a:t>Technologies to be </a:t>
             </a:r>
             <a:r>
               <a:rPr lang="en" sz="1800" dirty="0" smtClean="0"/>
-              <a:t>system</a:t>
+              <a:t>used</a:t>
             </a:r>
             <a:endParaRPr lang="en" sz="1800" dirty="0"/>
+          </a:p>
+          <a:p>
+            <a:pPr marL="1239012" lvl="3">
+              <a:spcBef>
+                <a:spcPts val="0"/>
+              </a:spcBef>
+              <a:buSzPct val="100000"/>
+            </a:pPr>
+            <a:r>
+              <a:rPr lang="en" dirty="0"/>
+              <a:t>HTML, CSS, JavaScript, </a:t>
+            </a:r>
+            <a:r>
+              <a:rPr lang="en" dirty="0" smtClean="0"/>
+              <a:t>Bootstrap</a:t>
+            </a:r>
+            <a:endParaRPr lang="en" sz="2000" dirty="0"/>
+          </a:p>
+          <a:p>
+            <a:pPr marL="685800" lvl="1" indent="0">
+              <a:spcBef>
+                <a:spcPts val="0"/>
+              </a:spcBef>
+              <a:buSzPct val="100000"/>
+              <a:buNone/>
+            </a:pPr>
+            <a:endParaRPr lang="en" sz="1800" dirty="0"/>
+          </a:p>
+          <a:p>
+            <a:pPr marL="685800" lvl="1" indent="0">
+              <a:spcBef>
+                <a:spcPts val="0"/>
+              </a:spcBef>
+              <a:buSzPct val="100000"/>
+              <a:buNone/>
+            </a:pPr>
+            <a:endParaRPr lang="en-US" dirty="0" smtClean="0"/>
           </a:p>
         </p:txBody>
       </p:sp>
     </p:spTree>
     <p:extLst>
       <p:ext uri="{BB962C8B-B14F-4D97-AF65-F5344CB8AC3E}">
-        <p14:creationId xmlns:p14="http://schemas.microsoft.com/office/powerpoint/2010/main" val="4152112009"/>
+        <p14:creationId xmlns:p14="http://schemas.microsoft.com/office/powerpoint/2010/main" val="745143634"/>
       </p:ext>
     </p:extLst>
   </p:cSld>
@@ -14933,4 +15428,324 @@
   <a:objectDefaults/>
   <a:extraClrSchemeLst/>
 </a:theme>
+</file>
+
+<file path=ppt/theme/theme2.xml><?xml version="1.0" encoding="utf-8"?>
+<a:theme xmlns:a="http://schemas.openxmlformats.org/drawingml/2006/main" name="Office Theme">
+  <a:themeElements>
+    <a:clrScheme name="Office">
+      <a:dk1>
+        <a:sysClr val="windowText" lastClr="000000"/>
+      </a:dk1>
+      <a:lt1>
+        <a:sysClr val="window" lastClr="FFFFFF"/>
+      </a:lt1>
+      <a:dk2>
+        <a:srgbClr val="1F497D"/>
+      </a:dk2>
+      <a:lt2>
+        <a:srgbClr val="EEECE1"/>
+      </a:lt2>
+      <a:accent1>
+        <a:srgbClr val="4F81BD"/>
+      </a:accent1>
+      <a:accent2>
+        <a:srgbClr val="C0504D"/>
+      </a:accent2>
+      <a:accent3>
+        <a:srgbClr val="9BBB59"/>
+      </a:accent3>
+      <a:accent4>
+        <a:srgbClr val="8064A2"/>
+      </a:accent4>
+      <a:accent5>
+        <a:srgbClr val="4BACC6"/>
+      </a:accent5>
+      <a:accent6>
+        <a:srgbClr val="F79646"/>
+      </a:accent6>
+      <a:hlink>
+        <a:srgbClr val="0000FF"/>
+      </a:hlink>
+      <a:folHlink>
+        <a:srgbClr val="800080"/>
+      </a:folHlink>
+    </a:clrScheme>
+    <a:fontScheme name="Office">
+      <a:majorFont>
+        <a:latin typeface="Calibri"/>
+        <a:ea typeface=""/>
+        <a:cs typeface=""/>
+        <a:font script="Jpan" typeface="ＭＳ Ｐゴシック"/>
+        <a:font script="Hang" typeface="맑은 고딕"/>
+        <a:font script="Hans" typeface="宋体"/>
+        <a:font script="Hant" typeface="新細明體"/>
+        <a:font script="Arab" typeface="Times New Roman"/>
+        <a:font script="Hebr" typeface="Times New Roman"/>
+        <a:font script="Thai" typeface="Angsana New"/>
+        <a:font script="Ethi" typeface="Nyala"/>
+        <a:font script="Beng" typeface="Vrinda"/>
+        <a:font script="Gujr" typeface="Shruti"/>
+        <a:font script="Khmr" typeface="MoolBoran"/>
+        <a:font script="Knda" typeface="Tunga"/>
+        <a:font script="Guru" typeface="Raavi"/>
+        <a:font script="Cans" typeface="Euphemia"/>
+        <a:font script="Cher" typeface="Plantagenet Cherokee"/>
+        <a:font script="Yiii" typeface="Microsoft Yi Baiti"/>
+        <a:font script="Tibt" typeface="Microsoft Himalaya"/>
+        <a:font script="Thaa" typeface="MV Boli"/>
+        <a:font script="Deva" typeface="Mangal"/>
+        <a:font script="Telu" typeface="Gautami"/>
+        <a:font script="Taml" typeface="Latha"/>
+        <a:font script="Syrc" typeface="Estrangelo Edessa"/>
+        <a:font script="Orya" typeface="Kalinga"/>
+        <a:font script="Mlym" typeface="Kartika"/>
+        <a:font script="Laoo" typeface="DokChampa"/>
+        <a:font script="Sinh" typeface="Iskoola Pota"/>
+        <a:font script="Mong" typeface="Mongolian Baiti"/>
+        <a:font script="Viet" typeface="Times New Roman"/>
+        <a:font script="Uigh" typeface="Microsoft Uighur"/>
+        <a:font script="Geor" typeface="Sylfaen"/>
+      </a:majorFont>
+      <a:minorFont>
+        <a:latin typeface="Calibri"/>
+        <a:ea typeface=""/>
+        <a:cs typeface=""/>
+        <a:font script="Jpan" typeface="ＭＳ Ｐゴシック"/>
+        <a:font script="Hang" typeface="맑은 고딕"/>
+        <a:font script="Hans" typeface="宋体"/>
+        <a:font script="Hant" typeface="新細明體"/>
+        <a:font script="Arab" typeface="Arial"/>
+        <a:font script="Hebr" typeface="Arial"/>
+        <a:font script="Thai" typeface="Cordia New"/>
+        <a:font script="Ethi" typeface="Nyala"/>
+        <a:font script="Beng" typeface="Vrinda"/>
+        <a:font script="Gujr" typeface="Shruti"/>
+        <a:font script="Khmr" typeface="DaunPenh"/>
+        <a:font script="Knda" typeface="Tunga"/>
+        <a:font script="Guru" typeface="Raavi"/>
+        <a:font script="Cans" typeface="Euphemia"/>
+        <a:font script="Cher" typeface="Plantagenet Cherokee"/>
+        <a:font script="Yiii" typeface="Microsoft Yi Baiti"/>
+        <a:font script="Tibt" typeface="Microsoft Himalaya"/>
+        <a:font script="Thaa" typeface="MV Boli"/>
+        <a:font script="Deva" typeface="Mangal"/>
+        <a:font script="Telu" typeface="Gautami"/>
+        <a:font script="Taml" typeface="Latha"/>
+        <a:font script="Syrc" typeface="Estrangelo Edessa"/>
+        <a:font script="Orya" typeface="Kalinga"/>
+        <a:font script="Mlym" typeface="Kartika"/>
+        <a:font script="Laoo" typeface="DokChampa"/>
+        <a:font script="Sinh" typeface="Iskoola Pota"/>
+        <a:font script="Mong" typeface="Mongolian Baiti"/>
+        <a:font script="Viet" typeface="Arial"/>
+        <a:font script="Uigh" typeface="Microsoft Uighur"/>
+        <a:font script="Geor" typeface="Sylfaen"/>
+      </a:minorFont>
+    </a:fontScheme>
+    <a:fmtScheme name="Office">
+      <a:fillStyleLst>
+        <a:solidFill>
+          <a:schemeClr val="phClr"/>
+        </a:solidFill>
+        <a:gradFill rotWithShape="1">
+          <a:gsLst>
+            <a:gs pos="0">
+              <a:schemeClr val="phClr">
+                <a:tint val="50000"/>
+                <a:satMod val="300000"/>
+              </a:schemeClr>
+            </a:gs>
+            <a:gs pos="35000">
+              <a:schemeClr val="phClr">
+                <a:tint val="37000"/>
+                <a:satMod val="300000"/>
+              </a:schemeClr>
+            </a:gs>
+            <a:gs pos="100000">
+              <a:schemeClr val="phClr">
+                <a:tint val="15000"/>
+                <a:satMod val="350000"/>
+              </a:schemeClr>
+            </a:gs>
+          </a:gsLst>
+          <a:lin ang="16200000" scaled="1"/>
+        </a:gradFill>
+        <a:gradFill rotWithShape="1">
+          <a:gsLst>
+            <a:gs pos="0">
+              <a:schemeClr val="phClr">
+                <a:tint val="100000"/>
+                <a:shade val="100000"/>
+                <a:satMod val="130000"/>
+              </a:schemeClr>
+            </a:gs>
+            <a:gs pos="100000">
+              <a:schemeClr val="phClr">
+                <a:tint val="50000"/>
+                <a:shade val="100000"/>
+                <a:satMod val="350000"/>
+              </a:schemeClr>
+            </a:gs>
+          </a:gsLst>
+          <a:lin ang="16200000" scaled="0"/>
+        </a:gradFill>
+      </a:fillStyleLst>
+      <a:lnStyleLst>
+        <a:ln w="9525" cap="flat" cmpd="sng" algn="ctr">
+          <a:solidFill>
+            <a:schemeClr val="phClr">
+              <a:shade val="95000"/>
+              <a:satMod val="105000"/>
+            </a:schemeClr>
+          </a:solidFill>
+          <a:prstDash val="solid"/>
+        </a:ln>
+        <a:ln w="25400" cap="flat" cmpd="sng" algn="ctr">
+          <a:solidFill>
+            <a:schemeClr val="phClr"/>
+          </a:solidFill>
+          <a:prstDash val="solid"/>
+        </a:ln>
+        <a:ln w="38100" cap="flat" cmpd="sng" algn="ctr">
+          <a:solidFill>
+            <a:schemeClr val="phClr"/>
+          </a:solidFill>
+          <a:prstDash val="solid"/>
+        </a:ln>
+      </a:lnStyleLst>
+      <a:effectStyleLst>
+        <a:effectStyle>
+          <a:effectLst>
+            <a:outerShdw blurRad="40000" dist="20000" dir="5400000" rotWithShape="0">
+              <a:srgbClr val="000000">
+                <a:alpha val="38000"/>
+              </a:srgbClr>
+            </a:outerShdw>
+          </a:effectLst>
+        </a:effectStyle>
+        <a:effectStyle>
+          <a:effectLst>
+            <a:outerShdw blurRad="40000" dist="23000" dir="5400000" rotWithShape="0">
+              <a:srgbClr val="000000">
+                <a:alpha val="35000"/>
+              </a:srgbClr>
+            </a:outerShdw>
+          </a:effectLst>
+        </a:effectStyle>
+        <a:effectStyle>
+          <a:effectLst>
+            <a:outerShdw blurRad="40000" dist="23000" dir="5400000" rotWithShape="0">
+              <a:srgbClr val="000000">
+                <a:alpha val="35000"/>
+              </a:srgbClr>
+            </a:outerShdw>
+          </a:effectLst>
+          <a:scene3d>
+            <a:camera prst="orthographicFront">
+              <a:rot lat="0" lon="0" rev="0"/>
+            </a:camera>
+            <a:lightRig rig="threePt" dir="t">
+              <a:rot lat="0" lon="0" rev="1200000"/>
+            </a:lightRig>
+          </a:scene3d>
+          <a:sp3d>
+            <a:bevelT w="63500" h="25400"/>
+          </a:sp3d>
+        </a:effectStyle>
+      </a:effectStyleLst>
+      <a:bgFillStyleLst>
+        <a:solidFill>
+          <a:schemeClr val="phClr"/>
+        </a:solidFill>
+        <a:gradFill rotWithShape="1">
+          <a:gsLst>
+            <a:gs pos="0">
+              <a:schemeClr val="phClr">
+                <a:tint val="40000"/>
+                <a:satMod val="350000"/>
+              </a:schemeClr>
+            </a:gs>
+            <a:gs pos="40000">
+              <a:schemeClr val="phClr">
+                <a:tint val="45000"/>
+                <a:shade val="99000"/>
+                <a:satMod val="350000"/>
+              </a:schemeClr>
+            </a:gs>
+            <a:gs pos="100000">
+              <a:schemeClr val="phClr">
+                <a:shade val="20000"/>
+                <a:satMod val="255000"/>
+              </a:schemeClr>
+            </a:gs>
+          </a:gsLst>
+          <a:path path="circle">
+            <a:fillToRect l="50000" t="-80000" r="50000" b="180000"/>
+          </a:path>
+        </a:gradFill>
+        <a:gradFill rotWithShape="1">
+          <a:gsLst>
+            <a:gs pos="0">
+              <a:schemeClr val="phClr">
+                <a:tint val="80000"/>
+                <a:satMod val="300000"/>
+              </a:schemeClr>
+            </a:gs>
+            <a:gs pos="100000">
+              <a:schemeClr val="phClr">
+                <a:shade val="30000"/>
+                <a:satMod val="200000"/>
+              </a:schemeClr>
+            </a:gs>
+          </a:gsLst>
+          <a:path path="circle">
+            <a:fillToRect l="50000" t="50000" r="50000" b="50000"/>
+          </a:path>
+        </a:gradFill>
+      </a:bgFillStyleLst>
+    </a:fmtScheme>
+  </a:themeElements>
+  <a:objectDefaults>
+    <a:spDef>
+      <a:spPr/>
+      <a:bodyPr/>
+      <a:lstStyle/>
+      <a:style>
+        <a:lnRef idx="1">
+          <a:schemeClr val="accent1"/>
+        </a:lnRef>
+        <a:fillRef idx="3">
+          <a:schemeClr val="accent1"/>
+        </a:fillRef>
+        <a:effectRef idx="2">
+          <a:schemeClr val="accent1"/>
+        </a:effectRef>
+        <a:fontRef idx="minor">
+          <a:schemeClr val="lt1"/>
+        </a:fontRef>
+      </a:style>
+    </a:spDef>
+    <a:lnDef>
+      <a:spPr/>
+      <a:bodyPr/>
+      <a:lstStyle/>
+      <a:style>
+        <a:lnRef idx="2">
+          <a:schemeClr val="accent1"/>
+        </a:lnRef>
+        <a:fillRef idx="0">
+          <a:schemeClr val="accent1"/>
+        </a:fillRef>
+        <a:effectRef idx="1">
+          <a:schemeClr val="accent1"/>
+        </a:effectRef>
+        <a:fontRef idx="minor">
+          <a:schemeClr val="tx1"/>
+        </a:fontRef>
+      </a:style>
+    </a:lnDef>
+  </a:objectDefaults>
+  <a:extraClrSchemeLst/>
+</a:theme>
 </file>
</xml_diff>